<commit_message>
Adding ML clustering model and notebook
</commit_message>
<xml_diff>
--- a/reports/Project Report_Mini Project DS_Adrian Maulana Muhammad.pptx
+++ b/reports/Project Report_Mini Project DS_Adrian Maulana Muhammad.pptx
@@ -6180,7 +6180,9 @@
         </p:nvSpPr>
         <p:spPr/>
         <p:txBody>
-          <a:bodyPr/>
+          <a:bodyPr>
+            <a:normAutofit/>
+          </a:bodyPr>
           <a:lstStyle/>
           <a:p>
             <a:pPr marL="514350" indent="-400050">
@@ -6229,7 +6231,22 @@
             </a:pPr>
             <a:r>
               <a:rPr lang="en-US" dirty="0"/>
-              <a:t>Exploratory Data Analysis (EDA) &amp; Statistical Analysis</a:t>
+              <a:t>Exploratory Data Analysis (</a:t>
+            </a:r>
+            <a:r>
+              <a:rPr lang="en-US"/>
+              <a:t>EDA)</a:t>
+            </a:r>
+            <a:endParaRPr lang="en-US" dirty="0"/>
+          </a:p>
+          <a:p>
+            <a:pPr marL="514350" indent="-400050">
+              <a:buFont typeface="+mj-lt"/>
+              <a:buAutoNum type="romanUcPeriod"/>
+            </a:pPr>
+            <a:r>
+              <a:rPr lang="en-US" dirty="0"/>
+              <a:t>Machine Learning Model - Clustering</a:t>
             </a:r>
           </a:p>
           <a:p>
@@ -6239,17 +6256,7 @@
             </a:pPr>
             <a:r>
               <a:rPr lang="en-US" dirty="0"/>
-              <a:t>Machine Learning Model</a:t>
-            </a:r>
-          </a:p>
-          <a:p>
-            <a:pPr marL="514350" indent="-400050">
-              <a:buFont typeface="+mj-lt"/>
-              <a:buAutoNum type="romanUcPeriod"/>
-            </a:pPr>
-            <a:r>
-              <a:rPr lang="en-US" dirty="0"/>
-              <a:t>Model Evaluation</a:t>
+              <a:t>Machine Learning Model - Classification</a:t>
             </a:r>
           </a:p>
           <a:p>

</xml_diff>